<commit_message>
poster revision and regression_latex
</commit_message>
<xml_diff>
--- a/Poster/ML_poster.pptx
+++ b/Poster/ML_poster.pptx
@@ -257,7 +257,7 @@
               <a:pPr>
                 <a:defRPr/>
               </a:pPr>
-              <a:t>3/2/18</a:t>
+              <a:t>3/3/2018</a:t>
             </a:fld>
             <a:endParaRPr lang="en-US" altLang="en-US"/>
           </a:p>
@@ -626,7 +626,7 @@
               </a14:hiddenFill>
             </a:ext>
             <a:ext uri="{FAA26D3D-D897-4be2-8F04-BA451C77F1D7}">
-              <ma14:placeholderFlag xmlns:ma14="http://schemas.microsoft.com/office/mac/drawingml/2011/main" val="1"/>
+              <ma14:placeholderFlag xmlns:ma14="http://schemas.microsoft.com/office/mac/drawingml/2011/main" xmlns="" val="1"/>
             </a:ext>
           </a:extLst>
         </p:spPr>
@@ -662,7 +662,7 @@
               </a14:hiddenLine>
             </a:ext>
             <a:ext uri="{FAA26D3D-D897-4be2-8F04-BA451C77F1D7}">
-              <ma14:placeholderFlag xmlns:ma14="http://schemas.microsoft.com/office/mac/drawingml/2011/main" val="1"/>
+              <ma14:placeholderFlag xmlns:ma14="http://schemas.microsoft.com/office/mac/drawingml/2011/main" xmlns="" val="1"/>
             </a:ext>
           </a:extLst>
         </p:spPr>
@@ -3549,7 +3549,7 @@
               </a14:hiddenLine>
             </a:ext>
             <a:ext uri="{FAA26D3D-D897-4be2-8F04-BA451C77F1D7}">
-              <ma14:placeholderFlag xmlns:ma14="http://schemas.microsoft.com/office/mac/drawingml/2011/main" val="1"/>
+              <ma14:placeholderFlag xmlns:ma14="http://schemas.microsoft.com/office/mac/drawingml/2011/main" xmlns="" val="1"/>
             </a:ext>
           </a:extLst>
         </p:spPr>
@@ -3610,7 +3610,7 @@
               </a14:hiddenLine>
             </a:ext>
             <a:ext uri="{FAA26D3D-D897-4be2-8F04-BA451C77F1D7}">
-              <ma14:placeholderFlag xmlns:ma14="http://schemas.microsoft.com/office/mac/drawingml/2011/main" val="1"/>
+              <ma14:placeholderFlag xmlns:ma14="http://schemas.microsoft.com/office/mac/drawingml/2011/main" xmlns="" val="1"/>
             </a:ext>
           </a:extLst>
         </p:spPr>
@@ -4568,7 +4568,7 @@
               </a:gs>
               <a:gs pos="100000">
                 <a:schemeClr val="accent5">
-                  <a:lumMod val="50000"/>
+                  <a:lumMod val="75000"/>
                 </a:schemeClr>
               </a:gs>
             </a:gsLst>
@@ -4721,15 +4721,64 @@
               <a:buNone/>
             </a:pPr>
             <a:r>
-              <a:rPr lang="en-US" altLang="en-US" sz="8228" b="1" dirty="0">
+              <a:rPr lang="en-US" altLang="en-US" sz="8800" b="1" dirty="0" smtClean="0">
                 <a:solidFill>
                   <a:schemeClr val="accent3">
                     <a:lumMod val="95000"/>
                   </a:schemeClr>
                 </a:solidFill>
               </a:rPr>
-              <a:t>How do presidential candidates speak differently </a:t>
-            </a:r>
+              <a:t>Trade Rhetoric Geography in the US Presidential Election Speeches</a:t>
+            </a:r>
+            <a:endParaRPr lang="en-US" altLang="en-US" sz="8800" b="1" dirty="0">
+              <a:solidFill>
+                <a:schemeClr val="accent3">
+                  <a:lumMod val="95000"/>
+                </a:schemeClr>
+              </a:solidFill>
+            </a:endParaRPr>
+          </a:p>
+          <a:p>
+            <a:pPr algn="ctr">
+              <a:spcBef>
+                <a:spcPct val="0"/>
+              </a:spcBef>
+              <a:buNone/>
+            </a:pPr>
+            <a:endParaRPr lang="en-US" altLang="en-US" sz="5143" dirty="0"/>
+          </a:p>
+          <a:p>
+            <a:pPr algn="ctr">
+              <a:spcBef>
+                <a:spcPct val="0"/>
+              </a:spcBef>
+              <a:buNone/>
+            </a:pPr>
+            <a:r>
+              <a:rPr lang="en-US" altLang="en-US" sz="5143" b="1" dirty="0" smtClean="0"/>
+              <a:t>Alice </a:t>
+            </a:r>
+            <a:r>
+              <a:rPr lang="en-US" altLang="en-US" sz="5143" b="1" dirty="0" err="1"/>
+              <a:t>Mee</a:t>
+            </a:r>
+            <a:r>
+              <a:rPr lang="en-US" altLang="en-US" sz="5143" b="1" dirty="0"/>
+              <a:t> </a:t>
+            </a:r>
+            <a:r>
+              <a:rPr lang="en-US" altLang="en-US" sz="5143" b="1" dirty="0" err="1"/>
+              <a:t>Seon</a:t>
+            </a:r>
+            <a:r>
+              <a:rPr lang="en-US" altLang="en-US" sz="5143" b="1" dirty="0"/>
+              <a:t> Chung(alicechung@uchicao.edu), </a:t>
+            </a:r>
+            <a:r>
+              <a:rPr lang="en-US" altLang="en-US" sz="5143" b="1" dirty="0" smtClean="0"/>
+              <a:t>Computational Social Sciences</a:t>
+            </a:r>
+            <a:endParaRPr lang="en-US" altLang="en-US" sz="5143" b="1" dirty="0" smtClean="0"/>
           </a:p>
           <a:p>
             <a:pPr algn="ctr">
@@ -4740,32 +4789,16 @@
               <a:buNone/>
             </a:pPr>
             <a:r>
-              <a:rPr lang="en-US" altLang="en-US" sz="8228" b="1" dirty="0">
-                <a:solidFill>
-                  <a:schemeClr val="accent3">
-                    <a:lumMod val="95000"/>
-                  </a:schemeClr>
-                </a:solidFill>
-              </a:rPr>
-              <a:t>about trade within </a:t>
-            </a:r>
-            <a:r>
-              <a:rPr lang="en-US" altLang="en-US" sz="8228" b="1" dirty="0">
-                <a:solidFill>
-                  <a:srgbClr val="FF0000"/>
-                </a:solidFill>
-              </a:rPr>
-              <a:t>rust belt regions</a:t>
-            </a:r>
-            <a:r>
-              <a:rPr lang="en-US" altLang="en-US" sz="8228" b="1" dirty="0">
-                <a:solidFill>
-                  <a:schemeClr val="accent3">
-                    <a:lumMod val="95000"/>
-                  </a:schemeClr>
-                </a:solidFill>
-              </a:rPr>
-              <a:t>? </a:t>
+              <a:rPr lang="en-US" altLang="en-US" sz="5143" b="1" dirty="0" smtClean="0"/>
+              <a:t>Minju </a:t>
+            </a:r>
+            <a:r>
+              <a:rPr lang="en-US" altLang="en-US" sz="5143" b="1" dirty="0"/>
+              <a:t>Kim(minjukim@uchicago.edu</a:t>
+            </a:r>
+            <a:r>
+              <a:rPr lang="en-US" altLang="en-US" sz="5143" b="1" dirty="0" smtClean="0"/>
+              <a:t>), Department of Political Science</a:t>
             </a:r>
           </a:p>
           <a:p>
@@ -4777,70 +4810,10 @@
               <a:buNone/>
             </a:pPr>
             <a:r>
-              <a:rPr lang="en-US" altLang="en-US" sz="5143" dirty="0" err="1">
-                <a:solidFill>
-                  <a:schemeClr val="bg1"/>
-                </a:solidFill>
-              </a:rPr>
-              <a:t>Minju</a:t>
-            </a:r>
-            <a:r>
-              <a:rPr lang="en-US" altLang="en-US" sz="5143" dirty="0">
-                <a:solidFill>
-                  <a:schemeClr val="bg1"/>
-                </a:solidFill>
-              </a:rPr>
-              <a:t> Kim(minjukim@uchicago.edu), Alice </a:t>
-            </a:r>
-            <a:r>
-              <a:rPr lang="en-US" altLang="en-US" sz="5143" dirty="0" err="1">
-                <a:solidFill>
-                  <a:schemeClr val="bg1"/>
-                </a:solidFill>
-              </a:rPr>
-              <a:t>Mee</a:t>
-            </a:r>
-            <a:r>
-              <a:rPr lang="en-US" altLang="en-US" sz="5143" dirty="0">
-                <a:solidFill>
-                  <a:schemeClr val="bg1"/>
-                </a:solidFill>
-              </a:rPr>
+              <a:rPr lang="en-US" altLang="en-US" sz="5143" dirty="0" smtClean="0"/>
               <a:t> </a:t>
             </a:r>
-            <a:r>
-              <a:rPr lang="en-US" altLang="en-US" sz="5143" dirty="0" err="1">
-                <a:solidFill>
-                  <a:schemeClr val="bg1"/>
-                </a:solidFill>
-              </a:rPr>
-              <a:t>Seon</a:t>
-            </a:r>
-            <a:r>
-              <a:rPr lang="en-US" altLang="en-US" sz="5143" dirty="0">
-                <a:solidFill>
-                  <a:schemeClr val="bg1"/>
-                </a:solidFill>
-              </a:rPr>
-              <a:t> Chung(alicechung@uchicao.edu)</a:t>
-            </a:r>
-          </a:p>
-          <a:p>
-            <a:pPr algn="ctr" eaLnBrk="1" hangingPunct="1">
-              <a:spcBef>
-                <a:spcPct val="0"/>
-              </a:spcBef>
-              <a:buFontTx/>
-              <a:buNone/>
-            </a:pPr>
-            <a:r>
-              <a:rPr lang="en-US" altLang="en-US" sz="5143" dirty="0">
-                <a:solidFill>
-                  <a:schemeClr val="bg1"/>
-                </a:solidFill>
-              </a:rPr>
-              <a:t>University of Chicago</a:t>
-            </a:r>
+            <a:endParaRPr lang="en-US" altLang="en-US" sz="5143" dirty="0"/>
           </a:p>
         </p:txBody>
       </p:sp>
@@ -5047,7 +5020,7 @@
         </p:nvSpPr>
         <p:spPr bwMode="auto">
           <a:xfrm>
-            <a:off x="11355717" y="5193847"/>
+            <a:off x="11606830" y="5158872"/>
             <a:ext cx="10360152" cy="1172936"/>
           </a:xfrm>
           <a:prstGeom prst="rect">
@@ -5248,7 +5221,7 @@
         </p:nvSpPr>
         <p:spPr bwMode="auto">
           <a:xfrm>
-            <a:off x="11355717" y="13532008"/>
+            <a:off x="11606830" y="13556841"/>
             <a:ext cx="10360152" cy="1172936"/>
           </a:xfrm>
           <a:prstGeom prst="rect">
@@ -5634,7 +5607,7 @@
         </p:nvSpPr>
         <p:spPr bwMode="auto">
           <a:xfrm>
-            <a:off x="381001" y="17754600"/>
+            <a:off x="381000" y="19871481"/>
             <a:ext cx="10360152" cy="1177018"/>
           </a:xfrm>
           <a:prstGeom prst="rect">
@@ -6050,11 +6023,6 @@
               </a:rPr>
               <a:t>Using 15 FREX words for each dimension, count the frequencies and scaled by each document length.</a:t>
             </a:r>
-            <a:endParaRPr lang="en-US" altLang="en-US" sz="4400" dirty="0" smtClean="0">
-              <a:latin typeface="Times New Roman" charset="0"/>
-              <a:ea typeface="Times New Roman" charset="0"/>
-              <a:cs typeface="Times New Roman" charset="0"/>
-            </a:endParaRPr>
           </a:p>
           <a:p>
             <a:pPr marL="685800" indent="-685800"/>
@@ -6064,15 +6032,7 @@
                 <a:ea typeface="Times New Roman" charset="0"/>
                 <a:cs typeface="Times New Roman" charset="0"/>
               </a:rPr>
-              <a:t>R</a:t>
-            </a:r>
-            <a:r>
-              <a:rPr lang="en-US" altLang="en-US" sz="4800" dirty="0" smtClean="0">
-                <a:latin typeface="Times New Roman" charset="0"/>
-                <a:ea typeface="Times New Roman" charset="0"/>
-                <a:cs typeface="Times New Roman" charset="0"/>
-              </a:rPr>
-              <a:t>egression Model</a:t>
+              <a:t>Regression Model</a:t>
             </a:r>
             <a:endParaRPr lang="en-US" altLang="en-US" sz="4800" dirty="0">
               <a:latin typeface="Times New Roman" charset="0"/>
@@ -6161,7 +6121,15 @@
                 <a:ea typeface="Times New Roman" charset="0"/>
                 <a:cs typeface="Times New Roman" charset="0"/>
               </a:rPr>
-              <a:t>of the author </a:t>
+              <a:t>of the </a:t>
+            </a:r>
+            <a:r>
+              <a:rPr lang="en-US" sz="4400" dirty="0" smtClean="0">
+                <a:latin typeface="Times New Roman" charset="0"/>
+                <a:ea typeface="Times New Roman" charset="0"/>
+                <a:cs typeface="Times New Roman" charset="0"/>
+              </a:rPr>
+              <a:t>speaker</a:t>
             </a:r>
             <a:endParaRPr lang="en-US" sz="4400" dirty="0" smtClean="0">
               <a:latin typeface="Times New Roman" charset="0"/>
@@ -6224,8 +6192,8 @@
         </p:nvSpPr>
         <p:spPr bwMode="auto">
           <a:xfrm>
-            <a:off x="509017" y="19278600"/>
-            <a:ext cx="10360152" cy="17089205"/>
+            <a:off x="381000" y="21603933"/>
+            <a:ext cx="10360152" cy="10884429"/>
           </a:xfrm>
           <a:prstGeom prst="rect">
             <a:avLst/>
@@ -6388,7 +6356,23 @@
                 <a:ea typeface="Times New Roman" charset="0"/>
                 <a:cs typeface="Times New Roman" charset="0"/>
               </a:rPr>
-              <a:t>: Presidential candidates talk trade as an act of economic transactions in speeches of rust belt regions.</a:t>
+              <a:t>: Presidential </a:t>
+            </a:r>
+            <a:r>
+              <a:rPr lang="en-US" sz="4800" dirty="0" smtClean="0">
+                <a:latin typeface="Times New Roman" charset="0"/>
+                <a:ea typeface="Times New Roman" charset="0"/>
+                <a:cs typeface="Times New Roman" charset="0"/>
+              </a:rPr>
+              <a:t>candidates frame trade as an economic activity in speeches </a:t>
+            </a:r>
+            <a:r>
+              <a:rPr lang="en-US" sz="4800" dirty="0">
+                <a:latin typeface="Times New Roman" charset="0"/>
+                <a:ea typeface="Times New Roman" charset="0"/>
+                <a:cs typeface="Times New Roman" charset="0"/>
+              </a:rPr>
+              <a:t>of rust belt regions.</a:t>
             </a:r>
           </a:p>
           <a:p>
@@ -6407,18 +6391,15 @@
                 <a:ea typeface="Times New Roman" charset="0"/>
                 <a:cs typeface="Times New Roman" charset="0"/>
               </a:rPr>
-              <a:t>: Presidential candidates link trade with national security in speeches of non-rustbelt regions.</a:t>
-            </a:r>
-          </a:p>
-          <a:p>
-            <a:pPr lvl="0" algn="just" latinLnBrk="1"/>
+              <a:t>: Presidential candidates </a:t>
+            </a:r>
             <a:r>
               <a:rPr lang="en-US" sz="4800" dirty="0" smtClean="0">
                 <a:latin typeface="Times New Roman" charset="0"/>
                 <a:ea typeface="Times New Roman" charset="0"/>
                 <a:cs typeface="Times New Roman" charset="0"/>
               </a:rPr>
-              <a:t> H3-1: </a:t>
+              <a:t>link </a:t>
             </a:r>
             <a:r>
               <a:rPr lang="en-US" sz="4800" dirty="0">
@@ -6426,26 +6407,50 @@
                 <a:ea typeface="Times New Roman" charset="0"/>
                 <a:cs typeface="Times New Roman" charset="0"/>
               </a:rPr>
-              <a:t>Within rust belt regions, if the regions are swing states, presidential candidates talk more about threatened job security due to import competition.</a:t>
-            </a:r>
-          </a:p>
-          <a:p>
-            <a:pPr lvl="0" algn="just" latinLnBrk="1"/>
+              <a:t>trade with </a:t>
+            </a:r>
+            <a:r>
+              <a:rPr lang="en-US" sz="4800" dirty="0" smtClean="0">
+                <a:latin typeface="Times New Roman" charset="0"/>
+                <a:ea typeface="Times New Roman" charset="0"/>
+                <a:cs typeface="Times New Roman" charset="0"/>
+              </a:rPr>
+              <a:t>national security </a:t>
+            </a:r>
+            <a:r>
+              <a:rPr lang="en-US" sz="4800" dirty="0" smtClean="0">
+                <a:latin typeface="Times New Roman" charset="0"/>
+                <a:ea typeface="Times New Roman" charset="0"/>
+                <a:cs typeface="Times New Roman" charset="0"/>
+              </a:rPr>
+              <a:t>in </a:t>
+            </a:r>
             <a:r>
               <a:rPr lang="en-US" sz="4800" dirty="0">
                 <a:latin typeface="Times New Roman" charset="0"/>
                 <a:ea typeface="Times New Roman" charset="0"/>
                 <a:cs typeface="Times New Roman" charset="0"/>
               </a:rPr>
-              <a:t>H3-2: Within rust belt regions, if the regions are swing states, Democrats link </a:t>
-            </a:r>
+              <a:t>speeches of non-rustbelt regions.</a:t>
+            </a:r>
+          </a:p>
+          <a:p>
+            <a:pPr lvl="0" algn="just" latinLnBrk="1"/>
             <a:r>
               <a:rPr lang="en-US" sz="4800" dirty="0" smtClean="0">
                 <a:latin typeface="Times New Roman" charset="0"/>
                 <a:ea typeface="Times New Roman" charset="0"/>
                 <a:cs typeface="Times New Roman" charset="0"/>
               </a:rPr>
-              <a:t>threatened </a:t>
+              <a:t> </a:t>
+            </a:r>
+            <a:r>
+              <a:rPr lang="en-US" sz="4800" dirty="0" smtClean="0">
+                <a:latin typeface="Times New Roman" charset="0"/>
+                <a:ea typeface="Times New Roman" charset="0"/>
+                <a:cs typeface="Times New Roman" charset="0"/>
+              </a:rPr>
+              <a:t>H3: </a:t>
             </a:r>
             <a:r>
               <a:rPr lang="en-US" sz="4800" dirty="0">
@@ -6453,31 +6458,55 @@
                 <a:ea typeface="Times New Roman" charset="0"/>
                 <a:cs typeface="Times New Roman" charset="0"/>
               </a:rPr>
-              <a:t>job security with domestic words (worker, </a:t>
-            </a:r>
-            <a:r>
-              <a:rPr lang="en-US" sz="4800" dirty="0" err="1">
+              <a:t>Within rust belt regions, if the regions are swing states, presidential candidates </a:t>
+            </a:r>
+            <a:r>
+              <a:rPr lang="en-US" sz="4800" dirty="0" smtClean="0">
                 <a:latin typeface="Times New Roman" charset="0"/>
                 <a:ea typeface="Times New Roman" charset="0"/>
                 <a:cs typeface="Times New Roman" charset="0"/>
               </a:rPr>
-              <a:t>manufactur</a:t>
-            </a:r>
+              <a:t>frame trade as </a:t>
+            </a:r>
+            <a:r>
+              <a:rPr lang="en-US" sz="4800" dirty="0" smtClean="0">
+                <a:latin typeface="Times New Roman" charset="0"/>
+                <a:ea typeface="Times New Roman" charset="0"/>
+                <a:cs typeface="Times New Roman" charset="0"/>
+              </a:rPr>
+              <a:t>special interest</a:t>
+            </a:r>
+            <a:r>
+              <a:rPr lang="en-US" sz="4800" dirty="0" smtClean="0">
+                <a:latin typeface="Times New Roman" charset="0"/>
+                <a:ea typeface="Times New Roman" charset="0"/>
+                <a:cs typeface="Times New Roman" charset="0"/>
+              </a:rPr>
+              <a:t> by linking trade with job security .</a:t>
+            </a:r>
+            <a:endParaRPr lang="en-US" sz="4800" dirty="0">
+              <a:latin typeface="Times New Roman" charset="0"/>
+              <a:ea typeface="Times New Roman" charset="0"/>
+              <a:cs typeface="Times New Roman" charset="0"/>
+            </a:endParaRPr>
+          </a:p>
+          <a:p>
+            <a:pPr lvl="0" algn="just" latinLnBrk="1"/>
             <a:r>
               <a:rPr lang="en-US" sz="4800" dirty="0">
                 <a:latin typeface="Times New Roman" charset="0"/>
                 <a:ea typeface="Times New Roman" charset="0"/>
                 <a:cs typeface="Times New Roman" charset="0"/>
               </a:rPr>
-              <a:t>, labor, plant, union) , while Republicans link threatened job security with foreign or international words (agreement, </a:t>
-            </a:r>
-            <a:r>
-              <a:rPr lang="en-US" sz="4800" dirty="0" err="1">
+              <a:t> </a:t>
+            </a:r>
+            <a:r>
+              <a:rPr lang="en-US" sz="4800" dirty="0" smtClean="0">
                 <a:latin typeface="Times New Roman" charset="0"/>
                 <a:ea typeface="Times New Roman" charset="0"/>
                 <a:cs typeface="Times New Roman" charset="0"/>
               </a:rPr>
-              <a:t>nafta</a:t>
+              <a:t>H4</a:t>
             </a:r>
             <a:r>
               <a:rPr lang="en-US" sz="4800" dirty="0">
@@ -6485,26 +6514,17 @@
                 <a:ea typeface="Times New Roman" charset="0"/>
                 <a:cs typeface="Times New Roman" charset="0"/>
               </a:rPr>
-              <a:t>, china, deal). </a:t>
-            </a:r>
-          </a:p>
-          <a:p>
-            <a:pPr lvl="0" algn="just" latinLnBrk="1"/>
-            <a:r>
-              <a:rPr lang="en-US" sz="4800" dirty="0">
+              <a:t>: Within non-rust belt regions, if the regions are swing states, presidential </a:t>
+            </a:r>
+            <a:r>
+              <a:rPr lang="en-US" sz="4800" dirty="0" smtClean="0">
                 <a:latin typeface="Times New Roman" charset="0"/>
                 <a:ea typeface="Times New Roman" charset="0"/>
                 <a:cs typeface="Times New Roman" charset="0"/>
               </a:rPr>
-              <a:t>H4: Within non-rust belt regions, if the regions are swing states, presidential candidates talk more about threatened national security due to globalization.</a:t>
-            </a:r>
-          </a:p>
-          <a:p>
-            <a:pPr algn="just">
-              <a:buFontTx/>
-              <a:buNone/>
-            </a:pPr>
-            <a:endParaRPr lang="en-US" altLang="en-US" sz="4800" dirty="0">
+              <a:t>candidates frame trade as a source of personal-level security threat. </a:t>
+            </a:r>
+            <a:endParaRPr lang="en-US" sz="4800" dirty="0">
               <a:latin typeface="Times New Roman" charset="0"/>
               <a:ea typeface="Times New Roman" charset="0"/>
               <a:cs typeface="Times New Roman" charset="0"/>
@@ -6692,7 +6712,7 @@
         </p:nvSpPr>
         <p:spPr bwMode="auto">
           <a:xfrm>
-            <a:off x="381000" y="12725400"/>
+            <a:off x="355600" y="14734950"/>
             <a:ext cx="10360152" cy="1177018"/>
           </a:xfrm>
           <a:prstGeom prst="rect">
@@ -6885,7 +6905,7 @@
         </p:nvSpPr>
         <p:spPr bwMode="auto">
           <a:xfrm>
-            <a:off x="381000" y="14157642"/>
+            <a:off x="431800" y="16261453"/>
             <a:ext cx="10360152" cy="3054594"/>
           </a:xfrm>
           <a:prstGeom prst="rect">
@@ -7034,17 +7054,40 @@
             </a:lvl9pPr>
           </a:lstStyle>
           <a:p>
-            <a:pPr marL="685800" lvl="0" indent="-685800">
-              <a:buFont typeface="Arial" charset="0"/>
-              <a:buChar char="•"/>
+            <a:pPr lvl="0">
+              <a:buNone/>
             </a:pPr>
+            <a:r>
+              <a:rPr lang="en-US" sz="4800" dirty="0" smtClean="0">
+                <a:latin typeface="Times New Roman" charset="0"/>
+                <a:ea typeface="Times New Roman" charset="0"/>
+                <a:cs typeface="Times New Roman" charset="0"/>
+              </a:rPr>
+              <a:t>Presidential </a:t>
+            </a:r>
             <a:r>
               <a:rPr lang="en-US" sz="4800" dirty="0">
                 <a:latin typeface="Times New Roman" charset="0"/>
                 <a:ea typeface="Times New Roman" charset="0"/>
                 <a:cs typeface="Times New Roman" charset="0"/>
               </a:rPr>
-              <a:t>Presidential candidates make campaign speeches considering the regional characteristics of the location where they delivery speech</a:t>
+              <a:t>candidates make campaign speeches considering the regional characteristics of </a:t>
+            </a:r>
+            <a:r>
+              <a:rPr lang="en-US" sz="4800" dirty="0" smtClean="0">
+                <a:latin typeface="Times New Roman" charset="0"/>
+                <a:ea typeface="Times New Roman" charset="0"/>
+                <a:cs typeface="Times New Roman" charset="0"/>
+              </a:rPr>
+              <a:t>the location where </a:t>
+            </a:r>
+            <a:r>
+              <a:rPr lang="en-US" sz="4800" dirty="0">
+                <a:latin typeface="Times New Roman" charset="0"/>
+                <a:ea typeface="Times New Roman" charset="0"/>
+                <a:cs typeface="Times New Roman" charset="0"/>
+              </a:rPr>
+              <a:t>they delivery speech</a:t>
             </a:r>
             <a:r>
               <a:rPr lang="en-US" sz="4800" dirty="0" smtClean="0">
@@ -7072,8 +7115,8 @@
         </p:nvSpPr>
         <p:spPr bwMode="auto">
           <a:xfrm>
-            <a:off x="11355717" y="6734591"/>
-            <a:ext cx="10360152" cy="5713783"/>
+            <a:off x="11326459" y="6589152"/>
+            <a:ext cx="10640523" cy="6895645"/>
           </a:xfrm>
           <a:prstGeom prst="rect">
             <a:avLst/>
@@ -7285,41 +7328,71 @@
               <a:t>Descriptive </a:t>
             </a:r>
             <a:r>
+              <a:rPr lang="en-US" altLang="en-US" sz="4800" dirty="0" smtClean="0">
+                <a:latin typeface="Times New Roman" charset="0"/>
+                <a:ea typeface="Times New Roman" charset="0"/>
+                <a:cs typeface="Times New Roman" charset="0"/>
+              </a:rPr>
+              <a:t>Statistics</a:t>
+            </a:r>
+            <a:br>
+              <a:rPr lang="en-US" altLang="en-US" sz="4800" dirty="0" smtClean="0">
+                <a:latin typeface="Times New Roman" charset="0"/>
+                <a:ea typeface="Times New Roman" charset="0"/>
+                <a:cs typeface="Times New Roman" charset="0"/>
+              </a:rPr>
+            </a:br>
+            <a:r>
+              <a:rPr lang="en-US" altLang="en-US" sz="4800" dirty="0" smtClean="0">
+                <a:latin typeface="Times New Roman" charset="0"/>
+                <a:ea typeface="Times New Roman" charset="0"/>
+                <a:cs typeface="Times New Roman" charset="0"/>
+              </a:rPr>
+              <a:t>(1) Total 1247 speeches, </a:t>
+            </a:r>
+            <a:br>
+              <a:rPr lang="en-US" altLang="en-US" sz="4800" dirty="0" smtClean="0">
+                <a:latin typeface="Times New Roman" charset="0"/>
+                <a:ea typeface="Times New Roman" charset="0"/>
+                <a:cs typeface="Times New Roman" charset="0"/>
+              </a:rPr>
+            </a:br>
+            <a:r>
+              <a:rPr lang="en-US" altLang="en-US" sz="4800" dirty="0" smtClean="0">
+                <a:latin typeface="Times New Roman" charset="0"/>
+                <a:ea typeface="Times New Roman" charset="0"/>
+                <a:cs typeface="Times New Roman" charset="0"/>
+              </a:rPr>
+              <a:t>(2) 676 from Democratic Party, 571 from Republican Party </a:t>
+            </a:r>
+            <a:r>
               <a:rPr lang="en-US" altLang="en-US" sz="4800" dirty="0">
                 <a:latin typeface="Times New Roman" charset="0"/>
                 <a:ea typeface="Times New Roman" charset="0"/>
                 <a:cs typeface="Times New Roman" charset="0"/>
               </a:rPr>
-              <a:t>Statistics</a:t>
-            </a:r>
-          </a:p>
-          <a:p>
-            <a:pPr marL="685800" indent="-685800">
-              <a:buFont typeface="Arial" charset="0"/>
-              <a:buChar char="•"/>
-            </a:pPr>
-            <a:r>
+              <a:t/>
+            </a:r>
+            <a:br>
               <a:rPr lang="en-US" altLang="en-US" sz="4800" dirty="0">
                 <a:latin typeface="Times New Roman" charset="0"/>
                 <a:ea typeface="Times New Roman" charset="0"/>
                 <a:cs typeface="Times New Roman" charset="0"/>
               </a:rPr>
-              <a:t>By party, by year</a:t>
-            </a:r>
-          </a:p>
-          <a:p>
-            <a:pPr marL="685800" indent="-685800">
-              <a:buFont typeface="Arial" charset="0"/>
-              <a:buChar char="•"/>
-            </a:pPr>
-            <a:r>
-              <a:rPr lang="en-US" altLang="en-US" sz="4800" dirty="0">
+            </a:br>
+            <a:r>
+              <a:rPr lang="en-US" altLang="en-US" sz="4800" dirty="0" smtClean="0">
                 <a:latin typeface="Times New Roman" charset="0"/>
                 <a:ea typeface="Times New Roman" charset="0"/>
                 <a:cs typeface="Times New Roman" charset="0"/>
               </a:rPr>
-              <a:t>Rust map </a:t>
-            </a:r>
+              <a:t>(3) 685, 282, 280 speeches in each year</a:t>
+            </a:r>
+            <a:endParaRPr lang="en-US" altLang="en-US" sz="4800" dirty="0" smtClean="0">
+              <a:latin typeface="Times New Roman" charset="0"/>
+              <a:ea typeface="Times New Roman" charset="0"/>
+              <a:cs typeface="Times New Roman" charset="0"/>
+            </a:endParaRPr>
           </a:p>
         </p:txBody>
       </p:sp>
@@ -7333,7 +7406,7 @@
         </p:nvSpPr>
         <p:spPr bwMode="auto">
           <a:xfrm>
-            <a:off x="33147000" y="5193847"/>
+            <a:off x="22510496" y="19129435"/>
             <a:ext cx="10360152" cy="1172936"/>
           </a:xfrm>
           <a:prstGeom prst="rect">
@@ -7506,13 +7579,18 @@
               <a:buNone/>
             </a:pPr>
             <a:r>
-              <a:rPr lang="en-US" altLang="en-US" sz="4628" dirty="0">
+              <a:rPr lang="en-US" altLang="en-US" sz="4628" dirty="0" smtClean="0">
                 <a:solidFill>
                   <a:schemeClr val="bg1"/>
                 </a:solidFill>
               </a:rPr>
-              <a:t>Regression Results</a:t>
-            </a:r>
+              <a:t>Word Cloud</a:t>
+            </a:r>
+            <a:endParaRPr lang="en-US" altLang="en-US" sz="4628" dirty="0">
+              <a:solidFill>
+                <a:schemeClr val="bg1"/>
+              </a:solidFill>
+            </a:endParaRPr>
           </a:p>
         </p:txBody>
       </p:sp>
@@ -7526,7 +7604,7 @@
         </p:nvSpPr>
         <p:spPr bwMode="auto">
           <a:xfrm>
-            <a:off x="33287480" y="25374600"/>
+            <a:off x="33683719" y="24389088"/>
             <a:ext cx="10360152" cy="1177018"/>
           </a:xfrm>
           <a:prstGeom prst="rect">
@@ -7884,7 +7962,7 @@
           <p:cNvPr id="2" name="TextBox 1">
             <a:extLst>
               <a:ext uri="{FF2B5EF4-FFF2-40B4-BE49-F238E27FC236}">
-                <a16:creationId xmlns:a16="http://schemas.microsoft.com/office/drawing/2014/main" xmlns="" id="{7B97C7E3-A8DF-4DC3-A1E2-1B0C28BA069E}"/>
+                <a16:creationId xmlns:a16="http://schemas.microsoft.com/office/drawing/2014/main" id="{7B97C7E3-A8DF-4DC3-A1E2-1B0C28BA069E}"/>
               </a:ext>
             </a:extLst>
           </p:cNvPr>
@@ -7911,153 +7989,16 @@
           </a:p>
         </p:txBody>
       </p:sp>
-      <p:grpSp>
-        <p:nvGrpSpPr>
-          <p:cNvPr id="8" name="Group 7"/>
-          <p:cNvGrpSpPr>
-            <a:grpSpLocks noChangeAspect="1"/>
-          </p:cNvGrpSpPr>
-          <p:nvPr/>
-        </p:nvGrpSpPr>
-        <p:grpSpPr>
-          <a:xfrm>
-            <a:off x="33275162" y="7153836"/>
-            <a:ext cx="10045593" cy="10058400"/>
-            <a:chOff x="14251882" y="9179809"/>
-            <a:chExt cx="15751722" cy="15771806"/>
-          </a:xfrm>
-        </p:grpSpPr>
-        <p:pic>
-          <p:nvPicPr>
-            <p:cNvPr id="4" name="Picture 3"/>
-            <p:cNvPicPr>
-              <a:picLocks noChangeAspect="1"/>
-            </p:cNvPicPr>
-            <p:nvPr/>
-          </p:nvPicPr>
-          <p:blipFill>
-            <a:blip r:embed="rId3" cstate="print">
-              <a:extLst>
-                <a:ext uri="{28A0092B-C50C-407E-A947-70E740481C1C}">
-                  <a14:useLocalDpi xmlns:a14="http://schemas.microsoft.com/office/drawing/2010/main" val="0"/>
-                </a:ext>
-              </a:extLst>
-            </a:blip>
-            <a:stretch>
-              <a:fillRect/>
-            </a:stretch>
-          </p:blipFill>
-          <p:spPr>
-            <a:xfrm>
-              <a:off x="14270219" y="17179215"/>
-              <a:ext cx="7772400" cy="7772400"/>
-            </a:xfrm>
-            <a:prstGeom prst="rect">
-              <a:avLst/>
-            </a:prstGeom>
-          </p:spPr>
-        </p:pic>
-        <p:pic>
-          <p:nvPicPr>
-            <p:cNvPr id="5" name="Picture 4"/>
-            <p:cNvPicPr>
-              <a:picLocks noChangeAspect="1"/>
-            </p:cNvPicPr>
-            <p:nvPr/>
-          </p:nvPicPr>
-          <p:blipFill>
-            <a:blip r:embed="rId4" cstate="print">
-              <a:extLst>
-                <a:ext uri="{28A0092B-C50C-407E-A947-70E740481C1C}">
-                  <a14:useLocalDpi xmlns:a14="http://schemas.microsoft.com/office/drawing/2010/main" val="0"/>
-                </a:ext>
-              </a:extLst>
-            </a:blip>
-            <a:stretch>
-              <a:fillRect/>
-            </a:stretch>
-          </p:blipFill>
-          <p:spPr>
-            <a:xfrm>
-              <a:off x="22231204" y="9185244"/>
-              <a:ext cx="7772400" cy="7772400"/>
-            </a:xfrm>
-            <a:prstGeom prst="rect">
-              <a:avLst/>
-            </a:prstGeom>
-          </p:spPr>
-        </p:pic>
-        <p:pic>
-          <p:nvPicPr>
-            <p:cNvPr id="6" name="Picture 5"/>
-            <p:cNvPicPr>
-              <a:picLocks noChangeAspect="1"/>
-            </p:cNvPicPr>
-            <p:nvPr/>
-          </p:nvPicPr>
-          <p:blipFill>
-            <a:blip r:embed="rId5" cstate="print">
-              <a:extLst>
-                <a:ext uri="{28A0092B-C50C-407E-A947-70E740481C1C}">
-                  <a14:useLocalDpi xmlns:a14="http://schemas.microsoft.com/office/drawing/2010/main" val="0"/>
-                </a:ext>
-              </a:extLst>
-            </a:blip>
-            <a:stretch>
-              <a:fillRect/>
-            </a:stretch>
-          </p:blipFill>
-          <p:spPr>
-            <a:xfrm>
-              <a:off x="14251882" y="9179809"/>
-              <a:ext cx="7772400" cy="7772400"/>
-            </a:xfrm>
-            <a:prstGeom prst="rect">
-              <a:avLst/>
-            </a:prstGeom>
-          </p:spPr>
-        </p:pic>
-        <p:pic>
-          <p:nvPicPr>
-            <p:cNvPr id="7" name="Picture 6"/>
-            <p:cNvPicPr>
-              <a:picLocks noChangeAspect="1"/>
-            </p:cNvPicPr>
-            <p:nvPr/>
-          </p:nvPicPr>
-          <p:blipFill>
-            <a:blip r:embed="rId6" cstate="print">
-              <a:extLst>
-                <a:ext uri="{28A0092B-C50C-407E-A947-70E740481C1C}">
-                  <a14:useLocalDpi xmlns:a14="http://schemas.microsoft.com/office/drawing/2010/main" val="0"/>
-                </a:ext>
-              </a:extLst>
-            </a:blip>
-            <a:stretch>
-              <a:fillRect/>
-            </a:stretch>
-          </p:blipFill>
-          <p:spPr>
-            <a:xfrm>
-              <a:off x="22212177" y="17179215"/>
-              <a:ext cx="7772400" cy="7772400"/>
-            </a:xfrm>
-            <a:prstGeom prst="rect">
-              <a:avLst/>
-            </a:prstGeom>
-          </p:spPr>
-        </p:pic>
-      </p:grpSp>
       <p:pic>
         <p:nvPicPr>
-          <p:cNvPr id="9" name="Picture 8"/>
+          <p:cNvPr id="10" name="Picture 9"/>
           <p:cNvPicPr>
             <a:picLocks noChangeAspect="1"/>
           </p:cNvPicPr>
           <p:nvPr/>
         </p:nvPicPr>
         <p:blipFill>
-          <a:blip r:embed="rId7">
+          <a:blip r:embed="rId3" cstate="print">
             <a:extLst>
               <a:ext uri="{28A0092B-C50C-407E-A947-70E740481C1C}">
                 <a14:useLocalDpi xmlns:a14="http://schemas.microsoft.com/office/drawing/2010/main" val="0"/>
@@ -8070,8 +8011,434 @@
         </p:blipFill>
         <p:spPr>
           <a:xfrm>
-            <a:off x="22482202" y="21190783"/>
-            <a:ext cx="10283798" cy="6546017"/>
+            <a:off x="34074100" y="17090066"/>
+            <a:ext cx="10058400" cy="6739847"/>
+          </a:xfrm>
+          <a:prstGeom prst="rect">
+            <a:avLst/>
+          </a:prstGeom>
+        </p:spPr>
+      </p:pic>
+      <p:sp>
+        <p:nvSpPr>
+          <p:cNvPr id="29" name="Rectangle 40"/>
+          <p:cNvSpPr>
+            <a:spLocks noChangeArrowheads="1"/>
+          </p:cNvSpPr>
+          <p:nvPr/>
+        </p:nvSpPr>
+        <p:spPr bwMode="auto">
+          <a:xfrm>
+            <a:off x="33480402" y="15249900"/>
+            <a:ext cx="10360152" cy="1177018"/>
+          </a:xfrm>
+          <a:prstGeom prst="rect">
+            <a:avLst/>
+          </a:prstGeom>
+          <a:solidFill>
+            <a:srgbClr val="002060"/>
+          </a:solidFill>
+          <a:ln>
+            <a:noFill/>
+          </a:ln>
+          <a:effectLst>
+            <a:outerShdw blurRad="190500" dist="228600" dir="2700000" algn="ctr">
+              <a:srgbClr val="000000">
+                <a:alpha val="30000"/>
+              </a:srgbClr>
+            </a:outerShdw>
+          </a:effectLst>
+          <a:scene3d>
+            <a:camera prst="orthographicFront">
+              <a:rot lat="0" lon="0" rev="0"/>
+            </a:camera>
+            <a:lightRig rig="glow" dir="t">
+              <a:rot lat="0" lon="0" rev="4800000"/>
+            </a:lightRig>
+          </a:scene3d>
+          <a:sp3d prstMaterial="matte">
+            <a:bevelT w="127000" h="63500"/>
+          </a:sp3d>
+        </p:spPr>
+        <p:txBody>
+          <a:bodyPr lIns="98973" tIns="49486" rIns="98973" bIns="49486" anchor="ctr"/>
+          <a:lstStyle>
+            <a:lvl1pPr defTabSz="3760788">
+              <a:spcBef>
+                <a:spcPct val="20000"/>
+              </a:spcBef>
+              <a:buChar char="•"/>
+              <a:defRPr sz="13100">
+                <a:solidFill>
+                  <a:schemeClr val="tx1"/>
+                </a:solidFill>
+                <a:latin typeface="Arial" charset="0"/>
+                <a:ea typeface="ＭＳ Ｐゴシック" charset="-128"/>
+              </a:defRPr>
+            </a:lvl1pPr>
+            <a:lvl2pPr marL="742950" indent="-285750" defTabSz="3760788">
+              <a:spcBef>
+                <a:spcPct val="20000"/>
+              </a:spcBef>
+              <a:buChar char="–"/>
+              <a:defRPr sz="11500">
+                <a:solidFill>
+                  <a:schemeClr val="tx1"/>
+                </a:solidFill>
+                <a:latin typeface="Arial" charset="0"/>
+                <a:ea typeface="ＭＳ Ｐゴシック" charset="-128"/>
+              </a:defRPr>
+            </a:lvl2pPr>
+            <a:lvl3pPr marL="1143000" indent="-228600" defTabSz="3760788">
+              <a:spcBef>
+                <a:spcPct val="20000"/>
+              </a:spcBef>
+              <a:buChar char="•"/>
+              <a:defRPr sz="9800">
+                <a:solidFill>
+                  <a:schemeClr val="tx1"/>
+                </a:solidFill>
+                <a:latin typeface="Arial" charset="0"/>
+                <a:ea typeface="ＭＳ Ｐゴシック" charset="-128"/>
+              </a:defRPr>
+            </a:lvl3pPr>
+            <a:lvl4pPr marL="1600200" indent="-228600" defTabSz="3760788">
+              <a:spcBef>
+                <a:spcPct val="20000"/>
+              </a:spcBef>
+              <a:buChar char="–"/>
+              <a:defRPr sz="8100">
+                <a:solidFill>
+                  <a:schemeClr val="tx1"/>
+                </a:solidFill>
+                <a:latin typeface="Arial" charset="0"/>
+                <a:ea typeface="ＭＳ Ｐゴシック" charset="-128"/>
+              </a:defRPr>
+            </a:lvl4pPr>
+            <a:lvl5pPr marL="2057400" indent="-228600" defTabSz="3760788">
+              <a:spcBef>
+                <a:spcPct val="20000"/>
+              </a:spcBef>
+              <a:buChar char="»"/>
+              <a:defRPr sz="8100">
+                <a:solidFill>
+                  <a:schemeClr val="tx1"/>
+                </a:solidFill>
+                <a:latin typeface="Arial" charset="0"/>
+                <a:ea typeface="ＭＳ Ｐゴシック" charset="-128"/>
+              </a:defRPr>
+            </a:lvl5pPr>
+            <a:lvl6pPr marL="2514600" indent="-228600" defTabSz="3760788" eaLnBrk="0" fontAlgn="base" hangingPunct="0">
+              <a:spcBef>
+                <a:spcPct val="20000"/>
+              </a:spcBef>
+              <a:spcAft>
+                <a:spcPct val="0"/>
+              </a:spcAft>
+              <a:buChar char="»"/>
+              <a:defRPr sz="8100">
+                <a:solidFill>
+                  <a:schemeClr val="tx1"/>
+                </a:solidFill>
+                <a:latin typeface="Arial" charset="0"/>
+                <a:ea typeface="ＭＳ Ｐゴシック" charset="-128"/>
+              </a:defRPr>
+            </a:lvl6pPr>
+            <a:lvl7pPr marL="2971800" indent="-228600" defTabSz="3760788" eaLnBrk="0" fontAlgn="base" hangingPunct="0">
+              <a:spcBef>
+                <a:spcPct val="20000"/>
+              </a:spcBef>
+              <a:spcAft>
+                <a:spcPct val="0"/>
+              </a:spcAft>
+              <a:buChar char="»"/>
+              <a:defRPr sz="8100">
+                <a:solidFill>
+                  <a:schemeClr val="tx1"/>
+                </a:solidFill>
+                <a:latin typeface="Arial" charset="0"/>
+                <a:ea typeface="ＭＳ Ｐゴシック" charset="-128"/>
+              </a:defRPr>
+            </a:lvl7pPr>
+            <a:lvl8pPr marL="3429000" indent="-228600" defTabSz="3760788" eaLnBrk="0" fontAlgn="base" hangingPunct="0">
+              <a:spcBef>
+                <a:spcPct val="20000"/>
+              </a:spcBef>
+              <a:spcAft>
+                <a:spcPct val="0"/>
+              </a:spcAft>
+              <a:buChar char="»"/>
+              <a:defRPr sz="8100">
+                <a:solidFill>
+                  <a:schemeClr val="tx1"/>
+                </a:solidFill>
+                <a:latin typeface="Arial" charset="0"/>
+                <a:ea typeface="ＭＳ Ｐゴシック" charset="-128"/>
+              </a:defRPr>
+            </a:lvl8pPr>
+            <a:lvl9pPr marL="3886200" indent="-228600" defTabSz="3760788" eaLnBrk="0" fontAlgn="base" hangingPunct="0">
+              <a:spcBef>
+                <a:spcPct val="20000"/>
+              </a:spcBef>
+              <a:spcAft>
+                <a:spcPct val="0"/>
+              </a:spcAft>
+              <a:buChar char="»"/>
+              <a:defRPr sz="8100">
+                <a:solidFill>
+                  <a:schemeClr val="tx1"/>
+                </a:solidFill>
+                <a:latin typeface="Arial" charset="0"/>
+                <a:ea typeface="ＭＳ Ｐゴシック" charset="-128"/>
+              </a:defRPr>
+            </a:lvl9pPr>
+          </a:lstStyle>
+          <a:p>
+            <a:pPr algn="ctr" eaLnBrk="1" hangingPunct="1">
+              <a:spcBef>
+                <a:spcPct val="0"/>
+              </a:spcBef>
+              <a:buFontTx/>
+              <a:buNone/>
+            </a:pPr>
+            <a:r>
+              <a:rPr lang="en-US" altLang="en-US" sz="4628" dirty="0" smtClean="0">
+                <a:solidFill>
+                  <a:schemeClr val="bg1"/>
+                </a:solidFill>
+              </a:rPr>
+              <a:t>Trade Topic Salience Map</a:t>
+            </a:r>
+            <a:endParaRPr lang="en-US" altLang="en-US" sz="4628" dirty="0">
+              <a:solidFill>
+                <a:schemeClr val="bg1"/>
+              </a:solidFill>
+            </a:endParaRPr>
+          </a:p>
+        </p:txBody>
+      </p:sp>
+      <p:sp>
+        <p:nvSpPr>
+          <p:cNvPr id="31" name="Rectangle 24"/>
+          <p:cNvSpPr>
+            <a:spLocks noChangeArrowheads="1"/>
+          </p:cNvSpPr>
+          <p:nvPr/>
+        </p:nvSpPr>
+        <p:spPr bwMode="auto">
+          <a:xfrm>
+            <a:off x="33553321" y="5193847"/>
+            <a:ext cx="10360152" cy="1172936"/>
+          </a:xfrm>
+          <a:prstGeom prst="rect">
+            <a:avLst/>
+          </a:prstGeom>
+          <a:solidFill>
+            <a:srgbClr val="002060"/>
+          </a:solidFill>
+          <a:ln>
+            <a:noFill/>
+          </a:ln>
+          <a:effectLst>
+            <a:outerShdw blurRad="190500" dist="228600" dir="2700000" algn="ctr">
+              <a:srgbClr val="000000">
+                <a:alpha val="30000"/>
+              </a:srgbClr>
+            </a:outerShdw>
+          </a:effectLst>
+          <a:scene3d>
+            <a:camera prst="orthographicFront">
+              <a:rot lat="0" lon="0" rev="0"/>
+            </a:camera>
+            <a:lightRig rig="glow" dir="t">
+              <a:rot lat="0" lon="0" rev="4800000"/>
+            </a:lightRig>
+          </a:scene3d>
+          <a:sp3d prstMaterial="matte">
+            <a:bevelT w="127000" h="63500"/>
+          </a:sp3d>
+        </p:spPr>
+        <p:txBody>
+          <a:bodyPr lIns="98973" tIns="49486" rIns="98973" bIns="49486" anchor="ctr"/>
+          <a:lstStyle>
+            <a:lvl1pPr defTabSz="3760788">
+              <a:spcBef>
+                <a:spcPct val="20000"/>
+              </a:spcBef>
+              <a:buChar char="•"/>
+              <a:defRPr sz="13100">
+                <a:solidFill>
+                  <a:schemeClr val="tx1"/>
+                </a:solidFill>
+                <a:latin typeface="Arial" charset="0"/>
+                <a:ea typeface="ＭＳ Ｐゴシック" charset="-128"/>
+              </a:defRPr>
+            </a:lvl1pPr>
+            <a:lvl2pPr marL="742950" indent="-285750" defTabSz="3760788">
+              <a:spcBef>
+                <a:spcPct val="20000"/>
+              </a:spcBef>
+              <a:buChar char="–"/>
+              <a:defRPr sz="11500">
+                <a:solidFill>
+                  <a:schemeClr val="tx1"/>
+                </a:solidFill>
+                <a:latin typeface="Arial" charset="0"/>
+                <a:ea typeface="ＭＳ Ｐゴシック" charset="-128"/>
+              </a:defRPr>
+            </a:lvl2pPr>
+            <a:lvl3pPr marL="1143000" indent="-228600" defTabSz="3760788">
+              <a:spcBef>
+                <a:spcPct val="20000"/>
+              </a:spcBef>
+              <a:buChar char="•"/>
+              <a:defRPr sz="9800">
+                <a:solidFill>
+                  <a:schemeClr val="tx1"/>
+                </a:solidFill>
+                <a:latin typeface="Arial" charset="0"/>
+                <a:ea typeface="ＭＳ Ｐゴシック" charset="-128"/>
+              </a:defRPr>
+            </a:lvl3pPr>
+            <a:lvl4pPr marL="1600200" indent="-228600" defTabSz="3760788">
+              <a:spcBef>
+                <a:spcPct val="20000"/>
+              </a:spcBef>
+              <a:buChar char="–"/>
+              <a:defRPr sz="8100">
+                <a:solidFill>
+                  <a:schemeClr val="tx1"/>
+                </a:solidFill>
+                <a:latin typeface="Arial" charset="0"/>
+                <a:ea typeface="ＭＳ Ｐゴシック" charset="-128"/>
+              </a:defRPr>
+            </a:lvl4pPr>
+            <a:lvl5pPr marL="2057400" indent="-228600" defTabSz="3760788">
+              <a:spcBef>
+                <a:spcPct val="20000"/>
+              </a:spcBef>
+              <a:buChar char="»"/>
+              <a:defRPr sz="8100">
+                <a:solidFill>
+                  <a:schemeClr val="tx1"/>
+                </a:solidFill>
+                <a:latin typeface="Arial" charset="0"/>
+                <a:ea typeface="ＭＳ Ｐゴシック" charset="-128"/>
+              </a:defRPr>
+            </a:lvl5pPr>
+            <a:lvl6pPr marL="2514600" indent="-228600" defTabSz="3760788" eaLnBrk="0" fontAlgn="base" hangingPunct="0">
+              <a:spcBef>
+                <a:spcPct val="20000"/>
+              </a:spcBef>
+              <a:spcAft>
+                <a:spcPct val="0"/>
+              </a:spcAft>
+              <a:buChar char="»"/>
+              <a:defRPr sz="8100">
+                <a:solidFill>
+                  <a:schemeClr val="tx1"/>
+                </a:solidFill>
+                <a:latin typeface="Arial" charset="0"/>
+                <a:ea typeface="ＭＳ Ｐゴシック" charset="-128"/>
+              </a:defRPr>
+            </a:lvl6pPr>
+            <a:lvl7pPr marL="2971800" indent="-228600" defTabSz="3760788" eaLnBrk="0" fontAlgn="base" hangingPunct="0">
+              <a:spcBef>
+                <a:spcPct val="20000"/>
+              </a:spcBef>
+              <a:spcAft>
+                <a:spcPct val="0"/>
+              </a:spcAft>
+              <a:buChar char="»"/>
+              <a:defRPr sz="8100">
+                <a:solidFill>
+                  <a:schemeClr val="tx1"/>
+                </a:solidFill>
+                <a:latin typeface="Arial" charset="0"/>
+                <a:ea typeface="ＭＳ Ｐゴシック" charset="-128"/>
+              </a:defRPr>
+            </a:lvl7pPr>
+            <a:lvl8pPr marL="3429000" indent="-228600" defTabSz="3760788" eaLnBrk="0" fontAlgn="base" hangingPunct="0">
+              <a:spcBef>
+                <a:spcPct val="20000"/>
+              </a:spcBef>
+              <a:spcAft>
+                <a:spcPct val="0"/>
+              </a:spcAft>
+              <a:buChar char="»"/>
+              <a:defRPr sz="8100">
+                <a:solidFill>
+                  <a:schemeClr val="tx1"/>
+                </a:solidFill>
+                <a:latin typeface="Arial" charset="0"/>
+                <a:ea typeface="ＭＳ Ｐゴシック" charset="-128"/>
+              </a:defRPr>
+            </a:lvl8pPr>
+            <a:lvl9pPr marL="3886200" indent="-228600" defTabSz="3760788" eaLnBrk="0" fontAlgn="base" hangingPunct="0">
+              <a:spcBef>
+                <a:spcPct val="20000"/>
+              </a:spcBef>
+              <a:spcAft>
+                <a:spcPct val="0"/>
+              </a:spcAft>
+              <a:buChar char="»"/>
+              <a:defRPr sz="8100">
+                <a:solidFill>
+                  <a:schemeClr val="tx1"/>
+                </a:solidFill>
+                <a:latin typeface="Arial" charset="0"/>
+                <a:ea typeface="ＭＳ Ｐゴシック" charset="-128"/>
+              </a:defRPr>
+            </a:lvl9pPr>
+          </a:lstStyle>
+          <a:p>
+            <a:pPr algn="ctr" eaLnBrk="1" hangingPunct="1">
+              <a:spcBef>
+                <a:spcPct val="0"/>
+              </a:spcBef>
+              <a:buFontTx/>
+              <a:buNone/>
+            </a:pPr>
+            <a:r>
+              <a:rPr lang="en-US" altLang="en-US" sz="4628" dirty="0" smtClean="0">
+                <a:solidFill>
+                  <a:schemeClr val="bg1"/>
+                </a:solidFill>
+              </a:rPr>
+              <a:t>Regression</a:t>
+            </a:r>
+            <a:endParaRPr lang="en-US" altLang="en-US" sz="4628" dirty="0">
+              <a:solidFill>
+                <a:schemeClr val="bg1"/>
+              </a:solidFill>
+            </a:endParaRPr>
+          </a:p>
+        </p:txBody>
+      </p:sp>
+      <p:pic>
+        <p:nvPicPr>
+          <p:cNvPr id="3" name="그림 2"/>
+          <p:cNvPicPr>
+            <a:picLocks noChangeAspect="1"/>
+          </p:cNvPicPr>
+          <p:nvPr/>
+        </p:nvPicPr>
+        <p:blipFill>
+          <a:blip r:embed="rId4">
+            <a:extLst>
+              <a:ext uri="{28A0092B-C50C-407E-A947-70E740481C1C}">
+                <a14:useLocalDpi xmlns:a14="http://schemas.microsoft.com/office/drawing/2010/main" val="0"/>
+              </a:ext>
+            </a:extLst>
+          </a:blip>
+          <a:stretch>
+            <a:fillRect/>
+          </a:stretch>
+        </p:blipFill>
+        <p:spPr>
+          <a:xfrm>
+            <a:off x="33683719" y="6759470"/>
+            <a:ext cx="9897714" cy="7975480"/>
           </a:xfrm>
           <a:prstGeom prst="rect">
             <a:avLst/>
@@ -8080,7 +8447,536 @@
       </p:pic>
       <p:pic>
         <p:nvPicPr>
-          <p:cNvPr id="10" name="Picture 9"/>
+          <p:cNvPr id="14" name="그림 13"/>
+          <p:cNvPicPr>
+            <a:picLocks noChangeAspect="1"/>
+          </p:cNvPicPr>
+          <p:nvPr/>
+        </p:nvPicPr>
+        <p:blipFill>
+          <a:blip r:embed="rId5">
+            <a:extLst>
+              <a:ext uri="{28A0092B-C50C-407E-A947-70E740481C1C}">
+                <a14:useLocalDpi xmlns:a14="http://schemas.microsoft.com/office/drawing/2010/main" val="0"/>
+              </a:ext>
+            </a:extLst>
+          </a:blip>
+          <a:stretch>
+            <a:fillRect/>
+          </a:stretch>
+        </p:blipFill>
+        <p:spPr>
+          <a:xfrm>
+            <a:off x="22624174" y="7402318"/>
+            <a:ext cx="9526329" cy="4763165"/>
+          </a:xfrm>
+          <a:prstGeom prst="rect">
+            <a:avLst/>
+          </a:prstGeom>
+        </p:spPr>
+      </p:pic>
+      <p:pic>
+        <p:nvPicPr>
+          <p:cNvPr id="15" name="그림 14"/>
+          <p:cNvPicPr>
+            <a:picLocks noChangeAspect="1"/>
+          </p:cNvPicPr>
+          <p:nvPr/>
+        </p:nvPicPr>
+        <p:blipFill>
+          <a:blip r:embed="rId6">
+            <a:extLst>
+              <a:ext uri="{28A0092B-C50C-407E-A947-70E740481C1C}">
+                <a14:useLocalDpi xmlns:a14="http://schemas.microsoft.com/office/drawing/2010/main" val="0"/>
+              </a:ext>
+            </a:extLst>
+          </a:blip>
+          <a:stretch>
+            <a:fillRect/>
+          </a:stretch>
+        </p:blipFill>
+        <p:spPr>
+          <a:xfrm>
+            <a:off x="22788049" y="13110182"/>
+            <a:ext cx="9526329" cy="4763165"/>
+          </a:xfrm>
+          <a:prstGeom prst="rect">
+            <a:avLst/>
+          </a:prstGeom>
+        </p:spPr>
+      </p:pic>
+      <p:sp>
+        <p:nvSpPr>
+          <p:cNvPr id="17" name="TextBox 16"/>
+          <p:cNvSpPr txBox="1"/>
+          <p:nvPr/>
+        </p:nvSpPr>
+        <p:spPr>
+          <a:xfrm>
+            <a:off x="325237" y="6412939"/>
+            <a:ext cx="10360152" cy="8217634"/>
+          </a:xfrm>
+          <a:prstGeom prst="rect">
+            <a:avLst/>
+          </a:prstGeom>
+          <a:noFill/>
+        </p:spPr>
+        <p:txBody>
+          <a:bodyPr wrap="square" rtlCol="0">
+            <a:spAutoFit/>
+          </a:bodyPr>
+          <a:lstStyle/>
+          <a:p>
+            <a:r>
+              <a:rPr lang="en-US" altLang="ko-KR" sz="4800" dirty="0" smtClean="0">
+                <a:latin typeface="Times New Roman" panose="02020603050405020304" pitchFamily="18" charset="0"/>
+                <a:cs typeface="Times New Roman" panose="02020603050405020304" pitchFamily="18" charset="0"/>
+              </a:rPr>
+              <a:t>Voters suffering from job insecurity due to international trade are known to punish the incumbent president by choosing the presidential candidate from the other political party (Jensen et al 2017; </a:t>
+            </a:r>
+            <a:r>
+              <a:rPr lang="en-US" altLang="ko-KR" sz="4800" dirty="0" err="1" smtClean="0">
+                <a:latin typeface="Times New Roman" panose="02020603050405020304" pitchFamily="18" charset="0"/>
+                <a:cs typeface="Times New Roman" panose="02020603050405020304" pitchFamily="18" charset="0"/>
+              </a:rPr>
+              <a:t>Margalit</a:t>
+            </a:r>
+            <a:r>
+              <a:rPr lang="en-US" altLang="ko-KR" sz="4800" dirty="0" smtClean="0">
+                <a:latin typeface="Times New Roman" panose="02020603050405020304" pitchFamily="18" charset="0"/>
+                <a:cs typeface="Times New Roman" panose="02020603050405020304" pitchFamily="18" charset="0"/>
+              </a:rPr>
+              <a:t> 2011). </a:t>
+            </a:r>
+          </a:p>
+          <a:p>
+            <a:endParaRPr lang="en-US" altLang="ko-KR" sz="4800" dirty="0" smtClean="0">
+              <a:latin typeface="Times New Roman" panose="02020603050405020304" pitchFamily="18" charset="0"/>
+              <a:cs typeface="Times New Roman" panose="02020603050405020304" pitchFamily="18" charset="0"/>
+            </a:endParaRPr>
+          </a:p>
+          <a:p>
+            <a:r>
+              <a:rPr lang="en-US" altLang="ko-KR" sz="4800" dirty="0" smtClean="0">
+                <a:latin typeface="Times New Roman" panose="02020603050405020304" pitchFamily="18" charset="0"/>
+                <a:cs typeface="Times New Roman" panose="02020603050405020304" pitchFamily="18" charset="0"/>
+              </a:rPr>
+              <a:t>Then,  how would  presidential candidates </a:t>
+            </a:r>
+            <a:r>
+              <a:rPr lang="en-US" altLang="ko-KR" sz="4800" i="1" dirty="0" smtClean="0">
+                <a:latin typeface="Times New Roman" panose="02020603050405020304" pitchFamily="18" charset="0"/>
+                <a:cs typeface="Times New Roman" panose="02020603050405020304" pitchFamily="18" charset="0"/>
+              </a:rPr>
+              <a:t>ex-ante</a:t>
+            </a:r>
+            <a:r>
+              <a:rPr lang="en-US" altLang="ko-KR" sz="4800" dirty="0" smtClean="0">
+                <a:latin typeface="Times New Roman" panose="02020603050405020304" pitchFamily="18" charset="0"/>
+                <a:cs typeface="Times New Roman" panose="02020603050405020304" pitchFamily="18" charset="0"/>
+              </a:rPr>
+              <a:t> respond to this voter punishment in their presidential campaign speeches?</a:t>
+            </a:r>
+            <a:endParaRPr lang="ko-KR" altLang="en-US" sz="4800" dirty="0">
+              <a:latin typeface="Times New Roman" panose="02020603050405020304" pitchFamily="18" charset="0"/>
+              <a:cs typeface="Times New Roman" panose="02020603050405020304" pitchFamily="18" charset="0"/>
+            </a:endParaRPr>
+          </a:p>
+        </p:txBody>
+      </p:sp>
+      <p:graphicFrame>
+        <p:nvGraphicFramePr>
+          <p:cNvPr id="19" name="표 18"/>
+          <p:cNvGraphicFramePr>
+            <a:graphicFrameLocks noGrp="1"/>
+          </p:cNvGraphicFramePr>
+          <p:nvPr>
+            <p:extLst>
+              <p:ext uri="{D42A27DB-BD31-4B8C-83A1-F6EECF244321}">
+                <p14:modId xmlns:p14="http://schemas.microsoft.com/office/powerpoint/2010/main" val="839632280"/>
+              </p:ext>
+            </p:extLst>
+          </p:nvPr>
+        </p:nvGraphicFramePr>
+        <p:xfrm>
+          <a:off x="22510497" y="20869436"/>
+          <a:ext cx="10558926" cy="11490044"/>
+        </p:xfrm>
+        <a:graphic>
+          <a:graphicData uri="http://schemas.openxmlformats.org/drawingml/2006/table">
+            <a:tbl>
+              <a:tblPr firstRow="1" bandRow="1">
+                <a:tableStyleId>{5C22544A-7EE6-4342-B048-85BDC9FD1C3A}</a:tableStyleId>
+              </a:tblPr>
+              <a:tblGrid>
+                <a:gridCol w="1359309">
+                  <a:extLst>
+                    <a:ext uri="{9D8B030D-6E8A-4147-A177-3AD203B41FA5}">
+                      <a16:colId xmlns:a16="http://schemas.microsoft.com/office/drawing/2014/main" val="4219704855"/>
+                    </a:ext>
+                  </a:extLst>
+                </a:gridCol>
+                <a:gridCol w="4666226">
+                  <a:extLst>
+                    <a:ext uri="{9D8B030D-6E8A-4147-A177-3AD203B41FA5}">
+                      <a16:colId xmlns:a16="http://schemas.microsoft.com/office/drawing/2014/main" val="663304543"/>
+                    </a:ext>
+                  </a:extLst>
+                </a:gridCol>
+                <a:gridCol w="4533391">
+                  <a:extLst>
+                    <a:ext uri="{9D8B030D-6E8A-4147-A177-3AD203B41FA5}">
+                      <a16:colId xmlns:a16="http://schemas.microsoft.com/office/drawing/2014/main" val="1331362254"/>
+                    </a:ext>
+                  </a:extLst>
+                </a:gridCol>
+              </a:tblGrid>
+              <a:tr h="1291759">
+                <a:tc>
+                  <a:txBody>
+                    <a:bodyPr/>
+                    <a:lstStyle/>
+                    <a:p>
+                      <a:pPr algn="ctr" latinLnBrk="1"/>
+                      <a:endParaRPr lang="ko-KR" altLang="en-US" sz="4800" b="1" dirty="0">
+                        <a:solidFill>
+                          <a:schemeClr val="accent6">
+                            <a:lumMod val="75000"/>
+                          </a:schemeClr>
+                        </a:solidFill>
+                        <a:latin typeface="Times New Roman" panose="02020603050405020304" pitchFamily="18" charset="0"/>
+                        <a:cs typeface="Times New Roman" panose="02020603050405020304" pitchFamily="18" charset="0"/>
+                      </a:endParaRPr>
+                    </a:p>
+                  </a:txBody>
+                  <a:tcPr anchor="ctr"/>
+                </a:tc>
+                <a:tc>
+                  <a:txBody>
+                    <a:bodyPr/>
+                    <a:lstStyle/>
+                    <a:p>
+                      <a:pPr algn="ctr" latinLnBrk="1"/>
+                      <a:r>
+                        <a:rPr lang="en-US" altLang="ko-KR" sz="4000" b="1" dirty="0" smtClean="0">
+                          <a:solidFill>
+                            <a:schemeClr val="accent6">
+                              <a:lumMod val="75000"/>
+                            </a:schemeClr>
+                          </a:solidFill>
+                          <a:latin typeface="Times New Roman" panose="02020603050405020304" pitchFamily="18" charset="0"/>
+                          <a:cs typeface="Times New Roman" panose="02020603050405020304" pitchFamily="18" charset="0"/>
+                        </a:rPr>
+                        <a:t>Swing </a:t>
+                      </a:r>
+                      <a:endParaRPr lang="ko-KR" altLang="en-US" sz="4000" b="1" dirty="0">
+                        <a:solidFill>
+                          <a:schemeClr val="accent6">
+                            <a:lumMod val="75000"/>
+                          </a:schemeClr>
+                        </a:solidFill>
+                        <a:latin typeface="Times New Roman" panose="02020603050405020304" pitchFamily="18" charset="0"/>
+                        <a:cs typeface="Times New Roman" panose="02020603050405020304" pitchFamily="18" charset="0"/>
+                      </a:endParaRPr>
+                    </a:p>
+                  </a:txBody>
+                  <a:tcPr anchor="ctr"/>
+                </a:tc>
+                <a:tc>
+                  <a:txBody>
+                    <a:bodyPr/>
+                    <a:lstStyle/>
+                    <a:p>
+                      <a:pPr algn="ctr" latinLnBrk="1"/>
+                      <a:r>
+                        <a:rPr lang="en-US" altLang="ko-KR" sz="4000" b="1" dirty="0" smtClean="0">
+                          <a:solidFill>
+                            <a:schemeClr val="accent6">
+                              <a:lumMod val="75000"/>
+                            </a:schemeClr>
+                          </a:solidFill>
+                          <a:latin typeface="Times New Roman" panose="02020603050405020304" pitchFamily="18" charset="0"/>
+                          <a:cs typeface="Times New Roman" panose="02020603050405020304" pitchFamily="18" charset="0"/>
+                        </a:rPr>
+                        <a:t>Non-swing</a:t>
+                      </a:r>
+                      <a:endParaRPr lang="ko-KR" altLang="en-US" sz="4000" b="1" dirty="0">
+                        <a:solidFill>
+                          <a:schemeClr val="accent6">
+                            <a:lumMod val="75000"/>
+                          </a:schemeClr>
+                        </a:solidFill>
+                        <a:latin typeface="Times New Roman" panose="02020603050405020304" pitchFamily="18" charset="0"/>
+                        <a:cs typeface="Times New Roman" panose="02020603050405020304" pitchFamily="18" charset="0"/>
+                      </a:endParaRPr>
+                    </a:p>
+                  </a:txBody>
+                  <a:tcPr anchor="ctr"/>
+                </a:tc>
+                <a:extLst>
+                  <a:ext uri="{0D108BD9-81ED-4DB2-BD59-A6C34878D82A}">
+                    <a16:rowId xmlns:a16="http://schemas.microsoft.com/office/drawing/2014/main" val="2978029908"/>
+                  </a:ext>
+                </a:extLst>
+              </a:tr>
+              <a:tr h="5019420">
+                <a:tc>
+                  <a:txBody>
+                    <a:bodyPr/>
+                    <a:lstStyle/>
+                    <a:p>
+                      <a:pPr algn="ctr" latinLnBrk="1"/>
+                      <a:r>
+                        <a:rPr lang="en-US" altLang="ko-KR" sz="4000" b="1" dirty="0" smtClean="0">
+                          <a:solidFill>
+                            <a:schemeClr val="accent6">
+                              <a:lumMod val="75000"/>
+                            </a:schemeClr>
+                          </a:solidFill>
+                          <a:latin typeface="Times New Roman" panose="02020603050405020304" pitchFamily="18" charset="0"/>
+                          <a:cs typeface="Times New Roman" panose="02020603050405020304" pitchFamily="18" charset="0"/>
+                        </a:rPr>
+                        <a:t>Rust</a:t>
+                      </a:r>
+                      <a:br>
+                        <a:rPr lang="en-US" altLang="ko-KR" sz="4000" b="1" dirty="0" smtClean="0">
+                          <a:solidFill>
+                            <a:schemeClr val="accent6">
+                              <a:lumMod val="75000"/>
+                            </a:schemeClr>
+                          </a:solidFill>
+                          <a:latin typeface="Times New Roman" panose="02020603050405020304" pitchFamily="18" charset="0"/>
+                          <a:cs typeface="Times New Roman" panose="02020603050405020304" pitchFamily="18" charset="0"/>
+                        </a:rPr>
+                      </a:br>
+                      <a:r>
+                        <a:rPr lang="en-US" altLang="ko-KR" sz="4000" b="1" baseline="0" dirty="0" smtClean="0">
+                          <a:solidFill>
+                            <a:schemeClr val="accent6">
+                              <a:lumMod val="75000"/>
+                            </a:schemeClr>
+                          </a:solidFill>
+                          <a:latin typeface="Times New Roman" panose="02020603050405020304" pitchFamily="18" charset="0"/>
+                          <a:cs typeface="Times New Roman" panose="02020603050405020304" pitchFamily="18" charset="0"/>
+                        </a:rPr>
+                        <a:t>belt</a:t>
+                      </a:r>
+                      <a:endParaRPr lang="ko-KR" altLang="en-US" sz="4000" b="1" dirty="0">
+                        <a:solidFill>
+                          <a:schemeClr val="accent6">
+                            <a:lumMod val="75000"/>
+                          </a:schemeClr>
+                        </a:solidFill>
+                        <a:latin typeface="Times New Roman" panose="02020603050405020304" pitchFamily="18" charset="0"/>
+                        <a:cs typeface="Times New Roman" panose="02020603050405020304" pitchFamily="18" charset="0"/>
+                      </a:endParaRPr>
+                    </a:p>
+                  </a:txBody>
+                  <a:tcPr anchor="ctr"/>
+                </a:tc>
+                <a:tc>
+                  <a:txBody>
+                    <a:bodyPr/>
+                    <a:lstStyle/>
+                    <a:p>
+                      <a:pPr algn="ctr" latinLnBrk="1"/>
+                      <a:endParaRPr lang="ko-KR" altLang="en-US" sz="4800" b="1" dirty="0">
+                        <a:solidFill>
+                          <a:schemeClr val="accent6">
+                            <a:lumMod val="75000"/>
+                          </a:schemeClr>
+                        </a:solidFill>
+                        <a:latin typeface="Times New Roman" panose="02020603050405020304" pitchFamily="18" charset="0"/>
+                        <a:cs typeface="Times New Roman" panose="02020603050405020304" pitchFamily="18" charset="0"/>
+                      </a:endParaRPr>
+                    </a:p>
+                  </a:txBody>
+                  <a:tcPr anchor="ctr"/>
+                </a:tc>
+                <a:tc>
+                  <a:txBody>
+                    <a:bodyPr/>
+                    <a:lstStyle/>
+                    <a:p>
+                      <a:pPr algn="ctr" latinLnBrk="1"/>
+                      <a:endParaRPr lang="ko-KR" altLang="en-US" sz="4800" b="1" dirty="0">
+                        <a:solidFill>
+                          <a:schemeClr val="accent6">
+                            <a:lumMod val="75000"/>
+                          </a:schemeClr>
+                        </a:solidFill>
+                        <a:latin typeface="Times New Roman" panose="02020603050405020304" pitchFamily="18" charset="0"/>
+                        <a:cs typeface="Times New Roman" panose="02020603050405020304" pitchFamily="18" charset="0"/>
+                      </a:endParaRPr>
+                    </a:p>
+                  </a:txBody>
+                  <a:tcPr anchor="ctr"/>
+                </a:tc>
+                <a:extLst>
+                  <a:ext uri="{0D108BD9-81ED-4DB2-BD59-A6C34878D82A}">
+                    <a16:rowId xmlns:a16="http://schemas.microsoft.com/office/drawing/2014/main" val="3918322365"/>
+                  </a:ext>
+                </a:extLst>
+              </a:tr>
+              <a:tr h="5178865">
+                <a:tc>
+                  <a:txBody>
+                    <a:bodyPr/>
+                    <a:lstStyle/>
+                    <a:p>
+                      <a:pPr algn="ctr" latinLnBrk="1"/>
+                      <a:r>
+                        <a:rPr lang="en-US" altLang="ko-KR" sz="4000" b="1" dirty="0" smtClean="0">
+                          <a:solidFill>
+                            <a:schemeClr val="accent6">
+                              <a:lumMod val="75000"/>
+                            </a:schemeClr>
+                          </a:solidFill>
+                          <a:latin typeface="Times New Roman" panose="02020603050405020304" pitchFamily="18" charset="0"/>
+                          <a:cs typeface="Times New Roman" panose="02020603050405020304" pitchFamily="18" charset="0"/>
+                        </a:rPr>
+                        <a:t>Non-</a:t>
+                      </a:r>
+                      <a:br>
+                        <a:rPr lang="en-US" altLang="ko-KR" sz="4000" b="1" dirty="0" smtClean="0">
+                          <a:solidFill>
+                            <a:schemeClr val="accent6">
+                              <a:lumMod val="75000"/>
+                            </a:schemeClr>
+                          </a:solidFill>
+                          <a:latin typeface="Times New Roman" panose="02020603050405020304" pitchFamily="18" charset="0"/>
+                          <a:cs typeface="Times New Roman" panose="02020603050405020304" pitchFamily="18" charset="0"/>
+                        </a:rPr>
+                      </a:br>
+                      <a:r>
+                        <a:rPr lang="en-US" altLang="ko-KR" sz="4000" b="1" dirty="0" smtClean="0">
+                          <a:solidFill>
+                            <a:schemeClr val="accent6">
+                              <a:lumMod val="75000"/>
+                            </a:schemeClr>
+                          </a:solidFill>
+                          <a:latin typeface="Times New Roman" panose="02020603050405020304" pitchFamily="18" charset="0"/>
+                          <a:cs typeface="Times New Roman" panose="02020603050405020304" pitchFamily="18" charset="0"/>
+                        </a:rPr>
+                        <a:t>Rust</a:t>
+                      </a:r>
+                      <a:br>
+                        <a:rPr lang="en-US" altLang="ko-KR" sz="4000" b="1" dirty="0" smtClean="0">
+                          <a:solidFill>
+                            <a:schemeClr val="accent6">
+                              <a:lumMod val="75000"/>
+                            </a:schemeClr>
+                          </a:solidFill>
+                          <a:latin typeface="Times New Roman" panose="02020603050405020304" pitchFamily="18" charset="0"/>
+                          <a:cs typeface="Times New Roman" panose="02020603050405020304" pitchFamily="18" charset="0"/>
+                        </a:rPr>
+                      </a:br>
+                      <a:r>
+                        <a:rPr lang="en-US" altLang="ko-KR" sz="4000" b="1" dirty="0" smtClean="0">
+                          <a:solidFill>
+                            <a:schemeClr val="accent6">
+                              <a:lumMod val="75000"/>
+                            </a:schemeClr>
+                          </a:solidFill>
+                          <a:latin typeface="Times New Roman" panose="02020603050405020304" pitchFamily="18" charset="0"/>
+                          <a:cs typeface="Times New Roman" panose="02020603050405020304" pitchFamily="18" charset="0"/>
+                        </a:rPr>
+                        <a:t>belt</a:t>
+                      </a:r>
+                      <a:endParaRPr lang="ko-KR" altLang="en-US" sz="4000" b="1" dirty="0">
+                        <a:solidFill>
+                          <a:schemeClr val="accent6">
+                            <a:lumMod val="75000"/>
+                          </a:schemeClr>
+                        </a:solidFill>
+                        <a:latin typeface="Times New Roman" panose="02020603050405020304" pitchFamily="18" charset="0"/>
+                        <a:cs typeface="Times New Roman" panose="02020603050405020304" pitchFamily="18" charset="0"/>
+                      </a:endParaRPr>
+                    </a:p>
+                  </a:txBody>
+                  <a:tcPr anchor="ctr"/>
+                </a:tc>
+                <a:tc>
+                  <a:txBody>
+                    <a:bodyPr/>
+                    <a:lstStyle/>
+                    <a:p>
+                      <a:pPr algn="ctr" latinLnBrk="1"/>
+                      <a:endParaRPr lang="ko-KR" altLang="en-US" sz="4800" b="1" dirty="0">
+                        <a:solidFill>
+                          <a:schemeClr val="accent6">
+                            <a:lumMod val="75000"/>
+                          </a:schemeClr>
+                        </a:solidFill>
+                        <a:latin typeface="Times New Roman" panose="02020603050405020304" pitchFamily="18" charset="0"/>
+                        <a:cs typeface="Times New Roman" panose="02020603050405020304" pitchFamily="18" charset="0"/>
+                      </a:endParaRPr>
+                    </a:p>
+                  </a:txBody>
+                  <a:tcPr anchor="ctr"/>
+                </a:tc>
+                <a:tc>
+                  <a:txBody>
+                    <a:bodyPr/>
+                    <a:lstStyle/>
+                    <a:p>
+                      <a:pPr algn="ctr" latinLnBrk="1"/>
+                      <a:endParaRPr lang="ko-KR" altLang="en-US" sz="4800" b="1" dirty="0">
+                        <a:solidFill>
+                          <a:schemeClr val="accent6">
+                            <a:lumMod val="75000"/>
+                          </a:schemeClr>
+                        </a:solidFill>
+                        <a:latin typeface="Times New Roman" panose="02020603050405020304" pitchFamily="18" charset="0"/>
+                        <a:cs typeface="Times New Roman" panose="02020603050405020304" pitchFamily="18" charset="0"/>
+                      </a:endParaRPr>
+                    </a:p>
+                  </a:txBody>
+                  <a:tcPr anchor="ctr"/>
+                </a:tc>
+                <a:extLst>
+                  <a:ext uri="{0D108BD9-81ED-4DB2-BD59-A6C34878D82A}">
+                    <a16:rowId xmlns:a16="http://schemas.microsoft.com/office/drawing/2014/main" val="1831740532"/>
+                  </a:ext>
+                </a:extLst>
+              </a:tr>
+            </a:tbl>
+          </a:graphicData>
+        </a:graphic>
+      </p:graphicFrame>
+      <p:pic>
+        <p:nvPicPr>
+          <p:cNvPr id="20" name="그림 19"/>
+          <p:cNvPicPr>
+            <a:picLocks noChangeAspect="1"/>
+          </p:cNvPicPr>
+          <p:nvPr/>
+        </p:nvPicPr>
+        <p:blipFill>
+          <a:blip r:embed="rId7" cstate="print">
+            <a:extLst>
+              <a:ext uri="{28A0092B-C50C-407E-A947-70E740481C1C}">
+                <a14:useLocalDpi xmlns:a14="http://schemas.microsoft.com/office/drawing/2010/main" val="0"/>
+              </a:ext>
+            </a:extLst>
+          </a:blip>
+          <a:stretch>
+            <a:fillRect/>
+          </a:stretch>
+        </p:blipFill>
+        <p:spPr>
+          <a:xfrm>
+            <a:off x="23971333" y="22430749"/>
+            <a:ext cx="4288119" cy="4288119"/>
+          </a:xfrm>
+          <a:prstGeom prst="rect">
+            <a:avLst/>
+          </a:prstGeom>
+        </p:spPr>
+      </p:pic>
+      <p:pic>
+        <p:nvPicPr>
+          <p:cNvPr id="23" name="그림 22"/>
           <p:cNvPicPr>
             <a:picLocks noChangeAspect="1"/>
           </p:cNvPicPr>
@@ -8100,8 +8996,8 @@
         </p:blipFill>
         <p:spPr>
           <a:xfrm>
-            <a:off x="22402800" y="6792161"/>
-            <a:ext cx="10058400" cy="6739847"/>
+            <a:off x="28622266" y="22430750"/>
+            <a:ext cx="4228668" cy="4228668"/>
           </a:xfrm>
           <a:prstGeom prst="rect">
             <a:avLst/>
@@ -8110,14 +9006,14 @@
       </p:pic>
       <p:pic>
         <p:nvPicPr>
-          <p:cNvPr id="11" name="Picture 10"/>
+          <p:cNvPr id="24" name="그림 23"/>
           <p:cNvPicPr>
             <a:picLocks noChangeAspect="1"/>
           </p:cNvPicPr>
           <p:nvPr/>
         </p:nvPicPr>
         <p:blipFill>
-          <a:blip r:embed="rId9">
+          <a:blip r:embed="rId9" cstate="print">
             <a:extLst>
               <a:ext uri="{28A0092B-C50C-407E-A947-70E740481C1C}">
                 <a14:useLocalDpi xmlns:a14="http://schemas.microsoft.com/office/drawing/2010/main" val="0"/>
@@ -8130,8 +9026,8 @@
         </p:blipFill>
         <p:spPr>
           <a:xfrm>
-            <a:off x="22559122" y="14251876"/>
-            <a:ext cx="10206878" cy="6703124"/>
+            <a:off x="23971333" y="27663567"/>
+            <a:ext cx="4197361" cy="4197361"/>
           </a:xfrm>
           <a:prstGeom prst="rect">
             <a:avLst/>
@@ -8140,14 +9036,14 @@
       </p:pic>
       <p:pic>
         <p:nvPicPr>
-          <p:cNvPr id="12" name="Picture 11"/>
+          <p:cNvPr id="25" name="그림 24"/>
           <p:cNvPicPr>
             <a:picLocks noChangeAspect="1"/>
           </p:cNvPicPr>
           <p:nvPr/>
         </p:nvPicPr>
         <p:blipFill>
-          <a:blip r:embed="rId10">
+          <a:blip r:embed="rId10" cstate="print">
             <a:extLst>
               <a:ext uri="{28A0092B-C50C-407E-A947-70E740481C1C}">
                 <a14:useLocalDpi xmlns:a14="http://schemas.microsoft.com/office/drawing/2010/main" val="0"/>
@@ -8160,44 +9056,77 @@
         </p:blipFill>
         <p:spPr>
           <a:xfrm>
-            <a:off x="38738752" y="18102484"/>
-            <a:ext cx="5933818" cy="8391295"/>
+            <a:off x="28616285" y="27626279"/>
+            <a:ext cx="4234649" cy="4234649"/>
           </a:xfrm>
           <a:prstGeom prst="rect">
             <a:avLst/>
           </a:prstGeom>
         </p:spPr>
       </p:pic>
-      <p:pic>
-        <p:nvPicPr>
-          <p:cNvPr id="13" name="Picture 12"/>
-          <p:cNvPicPr>
-            <a:picLocks noChangeAspect="1"/>
-          </p:cNvPicPr>
+      <p:sp>
+        <p:nvSpPr>
+          <p:cNvPr id="28" name="TextBox 27"/>
+          <p:cNvSpPr txBox="1"/>
           <p:nvPr/>
-        </p:nvPicPr>
-        <p:blipFill>
-          <a:blip r:embed="rId11">
-            <a:extLst>
-              <a:ext uri="{28A0092B-C50C-407E-A947-70E740481C1C}">
-                <a14:useLocalDpi xmlns:a14="http://schemas.microsoft.com/office/drawing/2010/main" val="0"/>
-              </a:ext>
-            </a:extLst>
-          </a:blip>
-          <a:stretch>
-            <a:fillRect/>
-          </a:stretch>
-        </p:blipFill>
+        </p:nvSpPr>
         <p:spPr>
           <a:xfrm>
-            <a:off x="33093832" y="17754600"/>
-            <a:ext cx="5983924" cy="8462152"/>
+            <a:off x="33705055" y="25997648"/>
+            <a:ext cx="10338816" cy="4524315"/>
           </a:xfrm>
           <a:prstGeom prst="rect">
             <a:avLst/>
           </a:prstGeom>
+          <a:noFill/>
         </p:spPr>
-      </p:pic>
+        <p:txBody>
+          <a:bodyPr wrap="square" rtlCol="0">
+            <a:spAutoFit/>
+          </a:bodyPr>
+          <a:lstStyle/>
+          <a:p>
+            <a:pPr marL="685800" indent="-685800">
+              <a:buFont typeface="Arial" panose="020B0604020202020204" pitchFamily="34" charset="0"/>
+              <a:buChar char="•"/>
+            </a:pPr>
+            <a:r>
+              <a:rPr lang="en-US" altLang="ko-KR" sz="4800" dirty="0" smtClean="0">
+                <a:latin typeface="Times New Roman" panose="02020603050405020304" pitchFamily="18" charset="0"/>
+                <a:cs typeface="Times New Roman" panose="02020603050405020304" pitchFamily="18" charset="0"/>
+              </a:rPr>
+              <a:t>Presidential Candidates </a:t>
+            </a:r>
+            <a:r>
+              <a:rPr lang="en-US" altLang="ko-KR" sz="4800" i="1" dirty="0" smtClean="0">
+                <a:latin typeface="Times New Roman" panose="02020603050405020304" pitchFamily="18" charset="0"/>
+                <a:cs typeface="Times New Roman" panose="02020603050405020304" pitchFamily="18" charset="0"/>
+              </a:rPr>
+              <a:t>ex-ante </a:t>
+            </a:r>
+            <a:r>
+              <a:rPr lang="en-US" altLang="ko-KR" sz="4800" dirty="0" smtClean="0">
+                <a:latin typeface="Times New Roman" panose="02020603050405020304" pitchFamily="18" charset="0"/>
+                <a:cs typeface="Times New Roman" panose="02020603050405020304" pitchFamily="18" charset="0"/>
+              </a:rPr>
+              <a:t>respond to voter punishment on trade through the means of adopting different rhetoric by region.</a:t>
+            </a:r>
+          </a:p>
+          <a:p>
+            <a:pPr marL="685800" indent="-685800">
+              <a:buFont typeface="Arial" panose="020B0604020202020204" pitchFamily="34" charset="0"/>
+              <a:buChar char="•"/>
+            </a:pPr>
+            <a:r>
+              <a:rPr lang="en-US" altLang="ko-KR" sz="4800" dirty="0" smtClean="0">
+                <a:latin typeface="Times New Roman" panose="02020603050405020304" pitchFamily="18" charset="0"/>
+                <a:cs typeface="Times New Roman" panose="02020603050405020304" pitchFamily="18" charset="0"/>
+              </a:rPr>
+              <a:t>The different rhetoric varies by political partisanship.</a:t>
+            </a:r>
+          </a:p>
+        </p:txBody>
+      </p:sp>
     </p:spTree>
   </p:cSld>
   <p:clrMapOvr>

</xml_diff>

<commit_message>
poster revision in conclusion
</commit_message>
<xml_diff>
--- a/Poster/ML_poster.pptx
+++ b/Poster/ML_poster.pptx
@@ -626,7 +626,7 @@
               </a14:hiddenFill>
             </a:ext>
             <a:ext uri="{FAA26D3D-D897-4be2-8F04-BA451C77F1D7}">
-              <ma14:placeholderFlag xmlns="" xmlns:ma14="http://schemas.microsoft.com/office/mac/drawingml/2011/main" val="1"/>
+              <ma14:placeholderFlag xmlns:ma14="http://schemas.microsoft.com/office/mac/drawingml/2011/main" xmlns="" val="1"/>
             </a:ext>
           </a:extLst>
         </p:spPr>
@@ -662,7 +662,7 @@
               </a14:hiddenLine>
             </a:ext>
             <a:ext uri="{FAA26D3D-D897-4be2-8F04-BA451C77F1D7}">
-              <ma14:placeholderFlag xmlns="" xmlns:ma14="http://schemas.microsoft.com/office/mac/drawingml/2011/main" val="1"/>
+              <ma14:placeholderFlag xmlns:ma14="http://schemas.microsoft.com/office/mac/drawingml/2011/main" xmlns="" val="1"/>
             </a:ext>
           </a:extLst>
         </p:spPr>
@@ -3549,7 +3549,7 @@
               </a14:hiddenLine>
             </a:ext>
             <a:ext uri="{FAA26D3D-D897-4be2-8F04-BA451C77F1D7}">
-              <ma14:placeholderFlag xmlns="" xmlns:ma14="http://schemas.microsoft.com/office/mac/drawingml/2011/main" val="1"/>
+              <ma14:placeholderFlag xmlns:ma14="http://schemas.microsoft.com/office/mac/drawingml/2011/main" xmlns="" val="1"/>
             </a:ext>
           </a:extLst>
         </p:spPr>
@@ -3610,7 +3610,7 @@
               </a14:hiddenLine>
             </a:ext>
             <a:ext uri="{FAA26D3D-D897-4be2-8F04-BA451C77F1D7}">
-              <ma14:placeholderFlag xmlns="" xmlns:ma14="http://schemas.microsoft.com/office/mac/drawingml/2011/main" val="1"/>
+              <ma14:placeholderFlag xmlns:ma14="http://schemas.microsoft.com/office/mac/drawingml/2011/main" xmlns="" val="1"/>
             </a:ext>
           </a:extLst>
         </p:spPr>
@@ -5641,13 +5641,18 @@
               <a:buNone/>
             </a:pPr>
             <a:r>
-              <a:rPr lang="en-US" altLang="en-US" sz="4628" dirty="0">
+              <a:rPr lang="en-US" altLang="en-US" sz="4628" dirty="0" smtClean="0">
                 <a:solidFill>
                   <a:schemeClr val="bg1"/>
                 </a:solidFill>
               </a:rPr>
-              <a:t>Abstract / Background</a:t>
-            </a:r>
+              <a:t>Background</a:t>
+            </a:r>
+            <a:endParaRPr lang="en-US" altLang="en-US" sz="4628" dirty="0">
+              <a:solidFill>
+                <a:schemeClr val="bg1"/>
+              </a:solidFill>
+            </a:endParaRPr>
           </a:p>
         </p:txBody>
       </p:sp>
@@ -6035,13 +6040,18 @@
               <a:buNone/>
             </a:pPr>
             <a:r>
-              <a:rPr lang="en-US" altLang="en-US" sz="4628" dirty="0">
+              <a:rPr lang="en-US" altLang="en-US" sz="4628" dirty="0" smtClean="0">
                 <a:solidFill>
                   <a:schemeClr val="bg1"/>
                 </a:solidFill>
               </a:rPr>
-              <a:t>Methods</a:t>
-            </a:r>
+              <a:t>Research Design</a:t>
+            </a:r>
+            <a:endParaRPr lang="en-US" altLang="en-US" sz="4628" dirty="0">
+              <a:solidFill>
+                <a:schemeClr val="bg1"/>
+              </a:solidFill>
+            </a:endParaRPr>
           </a:p>
         </p:txBody>
       </p:sp>
@@ -6659,7 +6669,39 @@
                 <a:ea typeface="Times New Roman" charset="0"/>
                 <a:cs typeface="Times New Roman" charset="0"/>
               </a:rPr>
-              <a:t>annual unemployment, speaker’s party status as a challenger, </a:t>
+              <a:t>annual </a:t>
+            </a:r>
+            <a:r>
+              <a:rPr lang="en-US" sz="4000" spc="-150" dirty="0" smtClean="0">
+                <a:latin typeface="Times New Roman" charset="0"/>
+                <a:ea typeface="Times New Roman" charset="0"/>
+                <a:cs typeface="Times New Roman" charset="0"/>
+              </a:rPr>
+              <a:t>unemployment </a:t>
+            </a:r>
+            <a:r>
+              <a:rPr lang="en-US" sz="4000" spc="-150" dirty="0" smtClean="0">
+                <a:latin typeface="Times New Roman" charset="0"/>
+                <a:ea typeface="Times New Roman" charset="0"/>
+                <a:cs typeface="Times New Roman" charset="0"/>
+              </a:rPr>
+              <a:t>rate</a:t>
+            </a:r>
+            <a:r>
+              <a:rPr lang="en-US" sz="4000" spc="-150" dirty="0" smtClean="0">
+                <a:latin typeface="Times New Roman" charset="0"/>
+                <a:ea typeface="Times New Roman" charset="0"/>
+                <a:cs typeface="Times New Roman" charset="0"/>
+              </a:rPr>
+              <a:t>, </a:t>
+            </a:r>
+            <a:r>
+              <a:rPr lang="en-US" sz="4000" spc="-150" dirty="0" smtClean="0">
+                <a:latin typeface="Times New Roman" charset="0"/>
+                <a:ea typeface="Times New Roman" charset="0"/>
+                <a:cs typeface="Times New Roman" charset="0"/>
+              </a:rPr>
+              <a:t>speaker’s party status as a challenger, </a:t>
             </a:r>
             <a:r>
               <a:rPr lang="en-US" sz="4000" spc="-150" dirty="0">
@@ -7811,7 +7853,23 @@
                 <a:ea typeface="Times New Roman" charset="0"/>
                 <a:cs typeface="Times New Roman" charset="0"/>
               </a:rPr>
-              <a:t>(2) 676 from Democratic Party, 571 from Republican Party </a:t>
+              <a:t>(2) </a:t>
+            </a:r>
+            <a:r>
+              <a:rPr lang="en-US" altLang="en-US" sz="4800" dirty="0" smtClean="0">
+                <a:latin typeface="Times New Roman" charset="0"/>
+                <a:ea typeface="Times New Roman" charset="0"/>
+                <a:cs typeface="Times New Roman" charset="0"/>
+              </a:rPr>
+              <a:t>676, 571 speeches from Democratic, Republican </a:t>
+            </a:r>
+            <a:r>
+              <a:rPr lang="en-US" altLang="en-US" sz="4800" dirty="0" smtClean="0">
+                <a:latin typeface="Times New Roman" charset="0"/>
+                <a:ea typeface="Times New Roman" charset="0"/>
+                <a:cs typeface="Times New Roman" charset="0"/>
+              </a:rPr>
+              <a:t>Party </a:t>
             </a:r>
             <a:r>
               <a:rPr lang="en-US" altLang="en-US" sz="4800" dirty="0">
@@ -7834,8 +7892,21 @@
                 <a:ea typeface="Times New Roman" charset="0"/>
                 <a:cs typeface="Times New Roman" charset="0"/>
               </a:rPr>
-              <a:t>(3) 685, 282, 280 speeches in each year</a:t>
-            </a:r>
+              <a:t>(3) 685, 282, 280 speeches </a:t>
+            </a:r>
+            <a:r>
+              <a:rPr lang="en-US" altLang="en-US" sz="4800" dirty="0" smtClean="0">
+                <a:latin typeface="Times New Roman" charset="0"/>
+                <a:ea typeface="Times New Roman" charset="0"/>
+                <a:cs typeface="Times New Roman" charset="0"/>
+              </a:rPr>
+              <a:t>in the 2008, 2012, 2016 presidential election</a:t>
+            </a:r>
+            <a:endParaRPr lang="en-US" altLang="en-US" sz="4800" dirty="0" smtClean="0">
+              <a:latin typeface="Times New Roman" charset="0"/>
+              <a:ea typeface="Times New Roman" charset="0"/>
+              <a:cs typeface="Times New Roman" charset="0"/>
+            </a:endParaRPr>
           </a:p>
         </p:txBody>
       </p:sp>
@@ -8220,13 +8291,18 @@
               <a:buNone/>
             </a:pPr>
             <a:r>
-              <a:rPr lang="en-US" altLang="en-US" sz="4628" dirty="0">
+              <a:rPr lang="en-US" altLang="en-US" sz="4628" dirty="0" smtClean="0">
                 <a:solidFill>
                   <a:schemeClr val="bg1"/>
                 </a:solidFill>
               </a:rPr>
-              <a:t>Contribution/Conclusions</a:t>
-            </a:r>
+              <a:t>Conclusion</a:t>
+            </a:r>
+            <a:endParaRPr lang="en-US" altLang="en-US" sz="4628" dirty="0">
+              <a:solidFill>
+                <a:schemeClr val="bg1"/>
+              </a:solidFill>
+            </a:endParaRPr>
           </a:p>
         </p:txBody>
       </p:sp>
@@ -8241,7 +8317,7 @@
         <p:spPr bwMode="auto">
           <a:xfrm>
             <a:off x="33683719" y="26073654"/>
-            <a:ext cx="10360152" cy="4679654"/>
+            <a:ext cx="10360152" cy="7043378"/>
           </a:xfrm>
           <a:prstGeom prst="rect">
             <a:avLst/>
@@ -8467,8 +8543,32 @@
                 <a:latin typeface="Times New Roman" panose="02020603050405020304" pitchFamily="18" charset="0"/>
                 <a:cs typeface="Times New Roman" panose="02020603050405020304" pitchFamily="18" charset="0"/>
               </a:rPr>
-              <a:t>rhetoric varies by political partisanship.</a:t>
-            </a:r>
+              <a:t>rhetoric varies by political </a:t>
+            </a:r>
+            <a:r>
+              <a:rPr lang="en-US" altLang="ko-KR" sz="4800" dirty="0" smtClean="0">
+                <a:latin typeface="Times New Roman" panose="02020603050405020304" pitchFamily="18" charset="0"/>
+                <a:cs typeface="Times New Roman" panose="02020603050405020304" pitchFamily="18" charset="0"/>
+              </a:rPr>
+              <a:t>party, with higher intensity in swing states. </a:t>
+            </a:r>
+          </a:p>
+          <a:p>
+            <a:pPr marL="685800" indent="-685800">
+              <a:buFont typeface="Arial" panose="020B0604020202020204" pitchFamily="34" charset="0"/>
+              <a:buChar char="•"/>
+            </a:pPr>
+            <a:r>
+              <a:rPr lang="en-US" altLang="ko-KR" sz="4800" dirty="0" smtClean="0">
+                <a:latin typeface="Times New Roman" panose="02020603050405020304" pitchFamily="18" charset="0"/>
+                <a:cs typeface="Times New Roman" panose="02020603050405020304" pitchFamily="18" charset="0"/>
+              </a:rPr>
+              <a:t>While Democrats target rustbelt voters, Republicans target non-rustbelt voters in their usage of trade rhetoric.</a:t>
+            </a:r>
+            <a:endParaRPr lang="en-US" altLang="ko-KR" sz="4800" dirty="0">
+              <a:latin typeface="Times New Roman" panose="02020603050405020304" pitchFamily="18" charset="0"/>
+              <a:cs typeface="Times New Roman" panose="02020603050405020304" pitchFamily="18" charset="0"/>
+            </a:endParaRPr>
           </a:p>
         </p:txBody>
       </p:sp>

</xml_diff>